<commit_message>
Additional file name tweaks from Obvience.
</commit_message>
<xml_diff>
--- a/learn-bizapps-pr/power-bi/model-data-power-bi/media-layered/PBI-source-graphics.pptx
+++ b/learn-bizapps-pr/power-bi/model-data-power-bi/media-layered/PBI-source-graphics.pptx
@@ -56509,8 +56509,8 @@
 </file>
 
 <file path=customXml/item1.xml><?xml version="1.0" encoding="utf-8"?>
-<ct:contentTypeSchema xmlns:ct="http://schemas.microsoft.com/office/2006/metadata/contentType" xmlns:ma="http://schemas.microsoft.com/office/2006/metadata/properties/metaAttributes" ct:_="" ma:_="" ma:contentTypeName="Document" ma:contentTypeID="0x010100E3FD940EE2838B45AB993ADA34E4783D" ma:contentTypeVersion="7" ma:contentTypeDescription="Create a new document." ma:contentTypeScope="" ma:versionID="4257d9291635bc5cb4c092963aa1be7a">
-  <xsd:schema xmlns:xsd="http://www.w3.org/2001/XMLSchema" xmlns:xs="http://www.w3.org/2001/XMLSchema" xmlns:p="http://schemas.microsoft.com/office/2006/metadata/properties" xmlns:ns2="08b54382-c677-4449-98d7-b90ff4f4e33a" targetNamespace="http://schemas.microsoft.com/office/2006/metadata/properties" ma:root="true" ma:fieldsID="bca45b24ba46885b01554d6d0eb772ad" ns2:_="">
+<ct:contentTypeSchema xmlns:ct="http://schemas.microsoft.com/office/2006/metadata/contentType" xmlns:ma="http://schemas.microsoft.com/office/2006/metadata/properties/metaAttributes" ct:_="" ma:_="" ma:contentTypeName="Document" ma:contentTypeID="0x010100E3FD940EE2838B45AB993ADA34E4783D" ma:contentTypeVersion="7" ma:contentTypeDescription="Create a new document." ma:contentTypeScope="" ma:versionID="ade2e80b87cb37ba6f94e81c3365b849">
+  <xsd:schema xmlns:xsd="http://www.w3.org/2001/XMLSchema" xmlns:xs="http://www.w3.org/2001/XMLSchema" xmlns:p="http://schemas.microsoft.com/office/2006/metadata/properties" xmlns:ns2="08b54382-c677-4449-98d7-b90ff4f4e33a" targetNamespace="http://schemas.microsoft.com/office/2006/metadata/properties" ma:root="true" ma:fieldsID="ff2a7fbf0c0a09b394f21031231ef037" ns2:_="">
     <xsd:import namespace="08b54382-c677-4449-98d7-b90ff4f4e33a"/>
     <xsd:element name="properties">
       <xsd:complexType>
@@ -56688,13 +56688,13 @@
 </file>
 
 <file path=customXml/itemProps1.xml><?xml version="1.0" encoding="utf-8"?>
-<ds:datastoreItem xmlns:ds="http://schemas.openxmlformats.org/officeDocument/2006/customXml" ds:itemID="{39CB641F-C1C1-4BE4-8813-C845A38A0D92}"/>
+<ds:datastoreItem xmlns:ds="http://schemas.openxmlformats.org/officeDocument/2006/customXml" ds:itemID="{14B91944-1140-437F-8E7B-0F36792A764F}"/>
 </file>
 
 <file path=customXml/itemProps2.xml><?xml version="1.0" encoding="utf-8"?>
-<ds:datastoreItem xmlns:ds="http://schemas.openxmlformats.org/officeDocument/2006/customXml" ds:itemID="{6FA99827-E74F-47B7-BD39-D0483B16DF7E}"/>
+<ds:datastoreItem xmlns:ds="http://schemas.openxmlformats.org/officeDocument/2006/customXml" ds:itemID="{31AD9D3F-0E3E-437D-AE1F-03F417BC3754}"/>
 </file>
 
 <file path=customXml/itemProps3.xml><?xml version="1.0" encoding="utf-8"?>
-<ds:datastoreItem xmlns:ds="http://schemas.openxmlformats.org/officeDocument/2006/customXml" ds:itemID="{7746D9BA-6DB1-474E-9C26-30264B7268E1}"/>
+<ds:datastoreItem xmlns:ds="http://schemas.openxmlformats.org/officeDocument/2006/customXml" ds:itemID="{3A47386C-FBC3-4B8F-AFD2-686AC25A54B1}"/>
 </file>
</xml_diff>

<commit_message>
Updates from Obvience (videos)
</commit_message>
<xml_diff>
--- a/learn-bizapps-pr/power-bi/model-data-power-bi/media-layered/PBI-source-graphics.pptx
+++ b/learn-bizapps-pr/power-bi/model-data-power-bi/media-layered/PBI-source-graphics.pptx
@@ -56688,13 +56688,13 @@
 </file>
 
 <file path=customXml/itemProps1.xml><?xml version="1.0" encoding="utf-8"?>
-<ds:datastoreItem xmlns:ds="http://schemas.openxmlformats.org/officeDocument/2006/customXml" ds:itemID="{14B91944-1140-437F-8E7B-0F36792A764F}"/>
+<ds:datastoreItem xmlns:ds="http://schemas.openxmlformats.org/officeDocument/2006/customXml" ds:itemID="{F5EF7550-4DD4-4DCE-AF9A-3CBD94545D8A}"/>
 </file>
 
 <file path=customXml/itemProps2.xml><?xml version="1.0" encoding="utf-8"?>
-<ds:datastoreItem xmlns:ds="http://schemas.openxmlformats.org/officeDocument/2006/customXml" ds:itemID="{31AD9D3F-0E3E-437D-AE1F-03F417BC3754}"/>
+<ds:datastoreItem xmlns:ds="http://schemas.openxmlformats.org/officeDocument/2006/customXml" ds:itemID="{6AC5A802-2D96-493D-AA3D-EDC0D18CA209}"/>
 </file>
 
 <file path=customXml/itemProps3.xml><?xml version="1.0" encoding="utf-8"?>
-<ds:datastoreItem xmlns:ds="http://schemas.openxmlformats.org/officeDocument/2006/customXml" ds:itemID="{3A47386C-FBC3-4B8F-AFD2-686AC25A54B1}"/>
+<ds:datastoreItem xmlns:ds="http://schemas.openxmlformats.org/officeDocument/2006/customXml" ds:itemID="{31B827EE-5717-4E95-A595-9411733ACC5C}"/>
 </file>
</xml_diff>